<commit_message>
verder gewerkt aan de powerpoint
</commit_message>
<xml_diff>
--- a/school/eindpresentatie.pptx
+++ b/school/eindpresentatie.pptx
@@ -12,6 +12,8 @@
     <p:sldId id="260" r:id="rId6"/>
     <p:sldId id="261" r:id="rId7"/>
     <p:sldId id="262" r:id="rId8"/>
+    <p:sldId id="263" r:id="rId9"/>
+    <p:sldId id="264" r:id="rId10"/>
   </p:sldIdLst>
   <p:sldSz cx="12192000" cy="6858000"/>
   <p:notesSz cx="6858000" cy="9144000"/>
@@ -110,7 +112,20 @@
       </a:defRPr>
     </a:lvl9pPr>
   </p:defaultTextStyle>
+  <p:extLst>
+    <p:ext uri="{EFAFB233-063F-42B5-8137-9DF3F51BA10A}">
+      <p15:sldGuideLst xmlns:p15="http://schemas.microsoft.com/office/powerpoint/2012/main"/>
+    </p:ext>
+  </p:extLst>
 </p:presentation>
+</file>
+
+<file path=ppt/revisionInfo.xml><?xml version="1.0" encoding="utf-8"?>
+<p1510:revInfo xmlns:a="http://schemas.openxmlformats.org/drawingml/2006/main" xmlns:r="http://schemas.openxmlformats.org/officeDocument/2006/relationships" xmlns:p1510="http://schemas.microsoft.com/office/powerpoint/2015/10/main">
+  <p1510:revLst>
+    <p1510:client id="{0AA9A39B-73AC-4DFD-BE12-D0BA0F090D19}" v="5" dt="2025-05-20T16:35:36.505"/>
+  </p1510:revLst>
+</p1510:revInfo>
 </file>
 
 <file path=ppt/changesInfos/changesInfo1.xml><?xml version="1.0" encoding="utf-8"?>
@@ -118,7 +133,7 @@
   <pc:docChgLst>
     <pc:chgData name="Debakker Stan" userId="dcaf6aa6-4ff3-4b00-8b67-253531728245" providerId="ADAL" clId="{0AA9A39B-73AC-4DFD-BE12-D0BA0F090D19}"/>
     <pc:docChg chg="custSel addSld modSld">
-      <pc:chgData name="Debakker Stan" userId="dcaf6aa6-4ff3-4b00-8b67-253531728245" providerId="ADAL" clId="{0AA9A39B-73AC-4DFD-BE12-D0BA0F090D19}" dt="2025-05-11T15:24:00.772" v="888" actId="20577"/>
+      <pc:chgData name="Debakker Stan" userId="dcaf6aa6-4ff3-4b00-8b67-253531728245" providerId="ADAL" clId="{0AA9A39B-73AC-4DFD-BE12-D0BA0F090D19}" dt="2025-05-20T16:35:36.505" v="956" actId="478"/>
       <pc:docMkLst>
         <pc:docMk/>
       </pc:docMkLst>
@@ -192,7 +207,7 @@
         </pc:spChg>
       </pc:sldChg>
       <pc:sldChg chg="modSp new mod">
-        <pc:chgData name="Debakker Stan" userId="dcaf6aa6-4ff3-4b00-8b67-253531728245" providerId="ADAL" clId="{0AA9A39B-73AC-4DFD-BE12-D0BA0F090D19}" dt="2025-05-11T15:15:47.244" v="504" actId="20577"/>
+        <pc:chgData name="Debakker Stan" userId="dcaf6aa6-4ff3-4b00-8b67-253531728245" providerId="ADAL" clId="{0AA9A39B-73AC-4DFD-BE12-D0BA0F090D19}" dt="2025-05-20T16:19:11.558" v="889" actId="20577"/>
         <pc:sldMkLst>
           <pc:docMk/>
           <pc:sldMk cId="1630845430" sldId="259"/>
@@ -206,7 +221,7 @@
           </ac:spMkLst>
         </pc:spChg>
         <pc:spChg chg="mod">
-          <ac:chgData name="Debakker Stan" userId="dcaf6aa6-4ff3-4b00-8b67-253531728245" providerId="ADAL" clId="{0AA9A39B-73AC-4DFD-BE12-D0BA0F090D19}" dt="2025-05-11T15:15:47.244" v="504" actId="20577"/>
+          <ac:chgData name="Debakker Stan" userId="dcaf6aa6-4ff3-4b00-8b67-253531728245" providerId="ADAL" clId="{0AA9A39B-73AC-4DFD-BE12-D0BA0F090D19}" dt="2025-05-20T16:19:11.558" v="889" actId="20577"/>
           <ac:spMkLst>
             <pc:docMk/>
             <pc:sldMk cId="1630845430" sldId="259"/>
@@ -237,8 +252,8 @@
           </ac:spMkLst>
         </pc:spChg>
       </pc:sldChg>
-      <pc:sldChg chg="modSp new mod">
-        <pc:chgData name="Debakker Stan" userId="dcaf6aa6-4ff3-4b00-8b67-253531728245" providerId="ADAL" clId="{0AA9A39B-73AC-4DFD-BE12-D0BA0F090D19}" dt="2025-05-11T15:21:34.504" v="772" actId="20577"/>
+      <pc:sldChg chg="addSp modSp new mod">
+        <pc:chgData name="Debakker Stan" userId="dcaf6aa6-4ff3-4b00-8b67-253531728245" providerId="ADAL" clId="{0AA9A39B-73AC-4DFD-BE12-D0BA0F090D19}" dt="2025-05-20T16:25:21.586" v="900" actId="14100"/>
         <pc:sldMkLst>
           <pc:docMk/>
           <pc:sldMk cId="2107465529" sldId="261"/>
@@ -252,16 +267,24 @@
           </ac:spMkLst>
         </pc:spChg>
         <pc:spChg chg="mod">
-          <ac:chgData name="Debakker Stan" userId="dcaf6aa6-4ff3-4b00-8b67-253531728245" providerId="ADAL" clId="{0AA9A39B-73AC-4DFD-BE12-D0BA0F090D19}" dt="2025-05-11T15:21:34.504" v="772" actId="20577"/>
+          <ac:chgData name="Debakker Stan" userId="dcaf6aa6-4ff3-4b00-8b67-253531728245" providerId="ADAL" clId="{0AA9A39B-73AC-4DFD-BE12-D0BA0F090D19}" dt="2025-05-20T16:19:40.691" v="891" actId="20577"/>
           <ac:spMkLst>
             <pc:docMk/>
             <pc:sldMk cId="2107465529" sldId="261"/>
             <ac:spMk id="3" creationId="{25AFCCE5-279C-F675-7F2B-042FC85B3354}"/>
           </ac:spMkLst>
         </pc:spChg>
+        <pc:picChg chg="add mod modCrop">
+          <ac:chgData name="Debakker Stan" userId="dcaf6aa6-4ff3-4b00-8b67-253531728245" providerId="ADAL" clId="{0AA9A39B-73AC-4DFD-BE12-D0BA0F090D19}" dt="2025-05-20T16:25:21.586" v="900" actId="14100"/>
+          <ac:picMkLst>
+            <pc:docMk/>
+            <pc:sldMk cId="2107465529" sldId="261"/>
+            <ac:picMk id="5" creationId="{58DCC40F-E9A5-3FDE-5775-3DE6E1882AE2}"/>
+          </ac:picMkLst>
+        </pc:picChg>
       </pc:sldChg>
       <pc:sldChg chg="modSp new mod">
-        <pc:chgData name="Debakker Stan" userId="dcaf6aa6-4ff3-4b00-8b67-253531728245" providerId="ADAL" clId="{0AA9A39B-73AC-4DFD-BE12-D0BA0F090D19}" dt="2025-05-11T15:24:00.772" v="888" actId="20577"/>
+        <pc:chgData name="Debakker Stan" userId="dcaf6aa6-4ff3-4b00-8b67-253531728245" providerId="ADAL" clId="{0AA9A39B-73AC-4DFD-BE12-D0BA0F090D19}" dt="2025-05-20T16:26:09.459" v="921" actId="313"/>
         <pc:sldMkLst>
           <pc:docMk/>
           <pc:sldMk cId="783345087" sldId="262"/>
@@ -275,13 +298,67 @@
           </ac:spMkLst>
         </pc:spChg>
         <pc:spChg chg="mod">
-          <ac:chgData name="Debakker Stan" userId="dcaf6aa6-4ff3-4b00-8b67-253531728245" providerId="ADAL" clId="{0AA9A39B-73AC-4DFD-BE12-D0BA0F090D19}" dt="2025-05-11T15:24:00.772" v="888" actId="20577"/>
+          <ac:chgData name="Debakker Stan" userId="dcaf6aa6-4ff3-4b00-8b67-253531728245" providerId="ADAL" clId="{0AA9A39B-73AC-4DFD-BE12-D0BA0F090D19}" dt="2025-05-20T16:26:09.459" v="921" actId="313"/>
           <ac:spMkLst>
             <pc:docMk/>
             <pc:sldMk cId="783345087" sldId="262"/>
             <ac:spMk id="3" creationId="{0C1AAD72-7AD2-666B-BEE6-1CAA4118FDCB}"/>
           </ac:spMkLst>
         </pc:spChg>
+      </pc:sldChg>
+      <pc:sldChg chg="addSp delSp modSp new mod">
+        <pc:chgData name="Debakker Stan" userId="dcaf6aa6-4ff3-4b00-8b67-253531728245" providerId="ADAL" clId="{0AA9A39B-73AC-4DFD-BE12-D0BA0F090D19}" dt="2025-05-20T16:35:36.505" v="956" actId="478"/>
+        <pc:sldMkLst>
+          <pc:docMk/>
+          <pc:sldMk cId="2897846572" sldId="263"/>
+        </pc:sldMkLst>
+        <pc:spChg chg="mod">
+          <ac:chgData name="Debakker Stan" userId="dcaf6aa6-4ff3-4b00-8b67-253531728245" providerId="ADAL" clId="{0AA9A39B-73AC-4DFD-BE12-D0BA0F090D19}" dt="2025-05-20T16:26:18.399" v="925" actId="20577"/>
+          <ac:spMkLst>
+            <pc:docMk/>
+            <pc:sldMk cId="2897846572" sldId="263"/>
+            <ac:spMk id="2" creationId="{D5CAACA4-779B-17C5-E54D-439422E4B821}"/>
+          </ac:spMkLst>
+        </pc:spChg>
+        <pc:spChg chg="mod">
+          <ac:chgData name="Debakker Stan" userId="dcaf6aa6-4ff3-4b00-8b67-253531728245" providerId="ADAL" clId="{0AA9A39B-73AC-4DFD-BE12-D0BA0F090D19}" dt="2025-05-20T16:27:22.077" v="948" actId="20577"/>
+          <ac:spMkLst>
+            <pc:docMk/>
+            <pc:sldMk cId="2897846572" sldId="263"/>
+            <ac:spMk id="3" creationId="{A0FB64FB-D377-C3B3-B269-B1EE32E505C8}"/>
+          </ac:spMkLst>
+        </pc:spChg>
+        <pc:picChg chg="add del mod">
+          <ac:chgData name="Debakker Stan" userId="dcaf6aa6-4ff3-4b00-8b67-253531728245" providerId="ADAL" clId="{0AA9A39B-73AC-4DFD-BE12-D0BA0F090D19}" dt="2025-05-20T16:35:25.773" v="952" actId="478"/>
+          <ac:picMkLst>
+            <pc:docMk/>
+            <pc:sldMk cId="2897846572" sldId="263"/>
+            <ac:picMk id="4" creationId="{C49FE8CA-7E83-58F2-67D7-3E61B8C2DBBD}"/>
+          </ac:picMkLst>
+        </pc:picChg>
+        <pc:picChg chg="add del mod">
+          <ac:chgData name="Debakker Stan" userId="dcaf6aa6-4ff3-4b00-8b67-253531728245" providerId="ADAL" clId="{0AA9A39B-73AC-4DFD-BE12-D0BA0F090D19}" dt="2025-05-20T16:35:36.505" v="956" actId="478"/>
+          <ac:picMkLst>
+            <pc:docMk/>
+            <pc:sldMk cId="2897846572" sldId="263"/>
+            <ac:picMk id="1026" creationId="{86940FE7-9B06-F4DA-3516-9B193203EBA9}"/>
+          </ac:picMkLst>
+        </pc:picChg>
+        <pc:picChg chg="add del">
+          <ac:chgData name="Debakker Stan" userId="dcaf6aa6-4ff3-4b00-8b67-253531728245" providerId="ADAL" clId="{0AA9A39B-73AC-4DFD-BE12-D0BA0F090D19}" dt="2025-05-20T16:35:36.505" v="956" actId="478"/>
+          <ac:picMkLst>
+            <pc:docMk/>
+            <pc:sldMk cId="2897846572" sldId="263"/>
+            <ac:picMk id="1028" creationId="{95A6F4C6-50CD-94DB-53C2-540145A6F63E}"/>
+          </ac:picMkLst>
+        </pc:picChg>
+      </pc:sldChg>
+      <pc:sldChg chg="new">
+        <pc:chgData name="Debakker Stan" userId="dcaf6aa6-4ff3-4b00-8b67-253531728245" providerId="ADAL" clId="{0AA9A39B-73AC-4DFD-BE12-D0BA0F090D19}" dt="2025-05-20T16:27:50.060" v="949" actId="680"/>
+        <pc:sldMkLst>
+          <pc:docMk/>
+          <pc:sldMk cId="1950788829" sldId="264"/>
+        </pc:sldMkLst>
       </pc:sldChg>
     </pc:docChg>
   </pc:docChgLst>
@@ -435,7 +512,7 @@
           <a:p>
             <a:fld id="{D3A58194-11B3-4AEE-8F9C-7C4B4F2B911F}" type="datetimeFigureOut">
               <a:rPr lang="nl-NL" smtClean="0"/>
-              <a:t>11-5-2025</a:t>
+              <a:t>20-5-2025</a:t>
             </a:fld>
             <a:endParaRPr lang="nl-NL"/>
           </a:p>
@@ -633,7 +710,7 @@
           <a:p>
             <a:fld id="{D3A58194-11B3-4AEE-8F9C-7C4B4F2B911F}" type="datetimeFigureOut">
               <a:rPr lang="nl-NL" smtClean="0"/>
-              <a:t>11-5-2025</a:t>
+              <a:t>20-5-2025</a:t>
             </a:fld>
             <a:endParaRPr lang="nl-NL"/>
           </a:p>
@@ -841,7 +918,7 @@
           <a:p>
             <a:fld id="{D3A58194-11B3-4AEE-8F9C-7C4B4F2B911F}" type="datetimeFigureOut">
               <a:rPr lang="nl-NL" smtClean="0"/>
-              <a:t>11-5-2025</a:t>
+              <a:t>20-5-2025</a:t>
             </a:fld>
             <a:endParaRPr lang="nl-NL"/>
           </a:p>
@@ -1039,7 +1116,7 @@
           <a:p>
             <a:fld id="{D3A58194-11B3-4AEE-8F9C-7C4B4F2B911F}" type="datetimeFigureOut">
               <a:rPr lang="nl-NL" smtClean="0"/>
-              <a:t>11-5-2025</a:t>
+              <a:t>20-5-2025</a:t>
             </a:fld>
             <a:endParaRPr lang="nl-NL"/>
           </a:p>
@@ -1314,7 +1391,7 @@
           <a:p>
             <a:fld id="{D3A58194-11B3-4AEE-8F9C-7C4B4F2B911F}" type="datetimeFigureOut">
               <a:rPr lang="nl-NL" smtClean="0"/>
-              <a:t>11-5-2025</a:t>
+              <a:t>20-5-2025</a:t>
             </a:fld>
             <a:endParaRPr lang="nl-NL"/>
           </a:p>
@@ -1579,7 +1656,7 @@
           <a:p>
             <a:fld id="{D3A58194-11B3-4AEE-8F9C-7C4B4F2B911F}" type="datetimeFigureOut">
               <a:rPr lang="nl-NL" smtClean="0"/>
-              <a:t>11-5-2025</a:t>
+              <a:t>20-5-2025</a:t>
             </a:fld>
             <a:endParaRPr lang="nl-NL"/>
           </a:p>
@@ -1991,7 +2068,7 @@
           <a:p>
             <a:fld id="{D3A58194-11B3-4AEE-8F9C-7C4B4F2B911F}" type="datetimeFigureOut">
               <a:rPr lang="nl-NL" smtClean="0"/>
-              <a:t>11-5-2025</a:t>
+              <a:t>20-5-2025</a:t>
             </a:fld>
             <a:endParaRPr lang="nl-NL"/>
           </a:p>
@@ -2132,7 +2209,7 @@
           <a:p>
             <a:fld id="{D3A58194-11B3-4AEE-8F9C-7C4B4F2B911F}" type="datetimeFigureOut">
               <a:rPr lang="nl-NL" smtClean="0"/>
-              <a:t>11-5-2025</a:t>
+              <a:t>20-5-2025</a:t>
             </a:fld>
             <a:endParaRPr lang="nl-NL"/>
           </a:p>
@@ -2245,7 +2322,7 @@
           <a:p>
             <a:fld id="{D3A58194-11B3-4AEE-8F9C-7C4B4F2B911F}" type="datetimeFigureOut">
               <a:rPr lang="nl-NL" smtClean="0"/>
-              <a:t>11-5-2025</a:t>
+              <a:t>20-5-2025</a:t>
             </a:fld>
             <a:endParaRPr lang="nl-NL"/>
           </a:p>
@@ -2556,7 +2633,7 @@
           <a:p>
             <a:fld id="{D3A58194-11B3-4AEE-8F9C-7C4B4F2B911F}" type="datetimeFigureOut">
               <a:rPr lang="nl-NL" smtClean="0"/>
-              <a:t>11-5-2025</a:t>
+              <a:t>20-5-2025</a:t>
             </a:fld>
             <a:endParaRPr lang="nl-NL"/>
           </a:p>
@@ -2844,7 +2921,7 @@
           <a:p>
             <a:fld id="{D3A58194-11B3-4AEE-8F9C-7C4B4F2B911F}" type="datetimeFigureOut">
               <a:rPr lang="nl-NL" smtClean="0"/>
-              <a:t>11-5-2025</a:t>
+              <a:t>20-5-2025</a:t>
             </a:fld>
             <a:endParaRPr lang="nl-NL"/>
           </a:p>
@@ -3085,7 +3162,7 @@
           <a:p>
             <a:fld id="{D3A58194-11B3-4AEE-8F9C-7C4B4F2B911F}" type="datetimeFigureOut">
               <a:rPr lang="nl-NL" smtClean="0"/>
-              <a:t>11-5-2025</a:t>
+              <a:t>20-5-2025</a:t>
             </a:fld>
             <a:endParaRPr lang="nl-NL"/>
           </a:p>
@@ -3875,7 +3952,7 @@
               <a:rPr lang="nl-NL" dirty="0">
                 <a:sym typeface="Wingdings" panose="05000000000000000000" pitchFamily="2" charset="2"/>
               </a:rPr>
-              <a:t>14 Chanels)(38 sensoren)</a:t>
+              <a:t>13 Chanels)(38 sensoren)</a:t>
             </a:r>
           </a:p>
           <a:p>
@@ -4166,7 +4243,7 @@
           <a:p>
             <a:r>
               <a:rPr lang="nl-NL" dirty="0"/>
-              <a:t>Van 1 naar 14 meetbare lichtbanden</a:t>
+              <a:t>Van 1 naar 13 meetbare lichtbanden</a:t>
             </a:r>
           </a:p>
           <a:p>
@@ -4177,6 +4254,35 @@
           </a:p>
         </p:txBody>
       </p:sp>
+      <p:pic>
+        <p:nvPicPr>
+          <p:cNvPr id="5" name="Afbeelding 4">
+            <a:extLst>
+              <a:ext uri="{FF2B5EF4-FFF2-40B4-BE49-F238E27FC236}">
+                <a16:creationId xmlns:a16="http://schemas.microsoft.com/office/drawing/2014/main" id="{58DCC40F-E9A5-3FDE-5775-3DE6E1882AE2}"/>
+              </a:ext>
+            </a:extLst>
+          </p:cNvPr>
+          <p:cNvPicPr>
+            <a:picLocks noChangeAspect="1"/>
+          </p:cNvPicPr>
+          <p:nvPr/>
+        </p:nvPicPr>
+        <p:blipFill>
+          <a:blip r:embed="rId2"/>
+          <a:srcRect l="3164" t="3088" r="1969" b="1193"/>
+          <a:stretch/>
+        </p:blipFill>
+        <p:spPr>
+          <a:xfrm>
+            <a:off x="4697129" y="2370290"/>
+            <a:ext cx="7494872" cy="4487710"/>
+          </a:xfrm>
+          <a:prstGeom prst="rect">
+            <a:avLst/>
+          </a:prstGeom>
+        </p:spPr>
+      </p:pic>
     </p:spTree>
     <p:extLst>
       <p:ext uri="{BB962C8B-B14F-4D97-AF65-F5344CB8AC3E}">
@@ -4280,11 +4386,7 @@
           <a:p>
             <a:r>
               <a:rPr lang="nl-NL" dirty="0"/>
-              <a:t>Lichtsensor van </a:t>
-            </a:r>
-            <a:r>
-              <a:rPr lang="nl-NL"/>
-              <a:t>8 bit naar 12 bit</a:t>
+              <a:t>Lichtsensor van 8 bit naar 12 bit (dynamisch bereik)</a:t>
             </a:r>
           </a:p>
         </p:txBody>
@@ -4293,6 +4395,179 @@
     <p:extLst>
       <p:ext uri="{BB962C8B-B14F-4D97-AF65-F5344CB8AC3E}">
         <p14:creationId xmlns:p14="http://schemas.microsoft.com/office/powerpoint/2010/main" val="783345087"/>
+      </p:ext>
+    </p:extLst>
+  </p:cSld>
+  <p:clrMapOvr>
+    <a:masterClrMapping/>
+  </p:clrMapOvr>
+</p:sld>
+</file>
+
+<file path=ppt/slides/slide8.xml><?xml version="1.0" encoding="utf-8"?>
+<p:sld xmlns:a="http://schemas.openxmlformats.org/drawingml/2006/main" xmlns:r="http://schemas.openxmlformats.org/officeDocument/2006/relationships" xmlns:p="http://schemas.openxmlformats.org/presentationml/2006/main">
+  <p:cSld>
+    <p:spTree>
+      <p:nvGrpSpPr>
+        <p:cNvPr id="1" name=""/>
+        <p:cNvGrpSpPr/>
+        <p:nvPr/>
+      </p:nvGrpSpPr>
+      <p:grpSpPr>
+        <a:xfrm>
+          <a:off x="0" y="0"/>
+          <a:ext cx="0" cy="0"/>
+          <a:chOff x="0" y="0"/>
+          <a:chExt cx="0" cy="0"/>
+        </a:xfrm>
+      </p:grpSpPr>
+      <p:sp>
+        <p:nvSpPr>
+          <p:cNvPr id="2" name="Titel 1">
+            <a:extLst>
+              <a:ext uri="{FF2B5EF4-FFF2-40B4-BE49-F238E27FC236}">
+                <a16:creationId xmlns:a16="http://schemas.microsoft.com/office/drawing/2014/main" id="{D5CAACA4-779B-17C5-E54D-439422E4B821}"/>
+              </a:ext>
+            </a:extLst>
+          </p:cNvPr>
+          <p:cNvSpPr>
+            <a:spLocks noGrp="1"/>
+          </p:cNvSpPr>
+          <p:nvPr>
+            <p:ph type="title"/>
+          </p:nvPr>
+        </p:nvSpPr>
+        <p:spPr/>
+        <p:txBody>
+          <a:bodyPr/>
+          <a:lstStyle/>
+          <a:p>
+            <a:r>
+              <a:rPr lang="nl-NL" dirty="0"/>
+              <a:t>hoe</a:t>
+            </a:r>
+          </a:p>
+        </p:txBody>
+      </p:sp>
+      <p:sp>
+        <p:nvSpPr>
+          <p:cNvPr id="3" name="Tijdelijke aanduiding voor inhoud 2">
+            <a:extLst>
+              <a:ext uri="{FF2B5EF4-FFF2-40B4-BE49-F238E27FC236}">
+                <a16:creationId xmlns:a16="http://schemas.microsoft.com/office/drawing/2014/main" id="{A0FB64FB-D377-C3B3-B269-B1EE32E505C8}"/>
+              </a:ext>
+            </a:extLst>
+          </p:cNvPr>
+          <p:cNvSpPr>
+            <a:spLocks noGrp="1"/>
+          </p:cNvSpPr>
+          <p:nvPr>
+            <p:ph idx="1"/>
+          </p:nvPr>
+        </p:nvSpPr>
+        <p:spPr/>
+        <p:txBody>
+          <a:bodyPr/>
+          <a:lstStyle/>
+          <a:p>
+            <a:r>
+              <a:rPr lang="nl-NL" dirty="0" err="1"/>
+              <a:t>Kicad</a:t>
+            </a:r>
+            <a:endParaRPr lang="nl-NL" dirty="0"/>
+          </a:p>
+          <a:p>
+            <a:r>
+              <a:rPr lang="nl-NL" dirty="0"/>
+              <a:t>Zelf aangeleerd</a:t>
+            </a:r>
+          </a:p>
+        </p:txBody>
+      </p:sp>
+    </p:spTree>
+    <p:extLst>
+      <p:ext uri="{BB962C8B-B14F-4D97-AF65-F5344CB8AC3E}">
+        <p14:creationId xmlns:p14="http://schemas.microsoft.com/office/powerpoint/2010/main" val="2897846572"/>
+      </p:ext>
+    </p:extLst>
+  </p:cSld>
+  <p:clrMapOvr>
+    <a:masterClrMapping/>
+  </p:clrMapOvr>
+</p:sld>
+</file>
+
+<file path=ppt/slides/slide9.xml><?xml version="1.0" encoding="utf-8"?>
+<p:sld xmlns:a="http://schemas.openxmlformats.org/drawingml/2006/main" xmlns:r="http://schemas.openxmlformats.org/officeDocument/2006/relationships" xmlns:p="http://schemas.openxmlformats.org/presentationml/2006/main">
+  <p:cSld>
+    <p:spTree>
+      <p:nvGrpSpPr>
+        <p:cNvPr id="1" name=""/>
+        <p:cNvGrpSpPr/>
+        <p:nvPr/>
+      </p:nvGrpSpPr>
+      <p:grpSpPr>
+        <a:xfrm>
+          <a:off x="0" y="0"/>
+          <a:ext cx="0" cy="0"/>
+          <a:chOff x="0" y="0"/>
+          <a:chExt cx="0" cy="0"/>
+        </a:xfrm>
+      </p:grpSpPr>
+      <p:sp>
+        <p:nvSpPr>
+          <p:cNvPr id="2" name="Titel 1">
+            <a:extLst>
+              <a:ext uri="{FF2B5EF4-FFF2-40B4-BE49-F238E27FC236}">
+                <a16:creationId xmlns:a16="http://schemas.microsoft.com/office/drawing/2014/main" id="{AE9D27F4-B44C-56B8-64AC-1B159CE59D78}"/>
+              </a:ext>
+            </a:extLst>
+          </p:cNvPr>
+          <p:cNvSpPr>
+            <a:spLocks noGrp="1"/>
+          </p:cNvSpPr>
+          <p:nvPr>
+            <p:ph type="title"/>
+          </p:nvPr>
+        </p:nvSpPr>
+        <p:spPr/>
+        <p:txBody>
+          <a:bodyPr/>
+          <a:lstStyle/>
+          <a:p>
+            <a:endParaRPr lang="nl-NL"/>
+          </a:p>
+        </p:txBody>
+      </p:sp>
+      <p:sp>
+        <p:nvSpPr>
+          <p:cNvPr id="3" name="Tijdelijke aanduiding voor inhoud 2">
+            <a:extLst>
+              <a:ext uri="{FF2B5EF4-FFF2-40B4-BE49-F238E27FC236}">
+                <a16:creationId xmlns:a16="http://schemas.microsoft.com/office/drawing/2014/main" id="{3CC036E1-3F02-C8D2-4983-17B928C294FD}"/>
+              </a:ext>
+            </a:extLst>
+          </p:cNvPr>
+          <p:cNvSpPr>
+            <a:spLocks noGrp="1"/>
+          </p:cNvSpPr>
+          <p:nvPr>
+            <p:ph idx="1"/>
+          </p:nvPr>
+        </p:nvSpPr>
+        <p:spPr/>
+        <p:txBody>
+          <a:bodyPr/>
+          <a:lstStyle/>
+          <a:p>
+            <a:endParaRPr lang="nl-NL"/>
+          </a:p>
+        </p:txBody>
+      </p:sp>
+    </p:spTree>
+    <p:extLst>
+      <p:ext uri="{BB962C8B-B14F-4D97-AF65-F5344CB8AC3E}">
+        <p14:creationId xmlns:p14="http://schemas.microsoft.com/office/powerpoint/2010/main" val="1950788829"/>
       </p:ext>
     </p:extLst>
   </p:cSld>

</xml_diff>